<commit_message>
added photos for sample dialogue to chatbot
</commit_message>
<xml_diff>
--- a/Presentation/COMP3111 Presentation.pptx
+++ b/Presentation/COMP3111 Presentation.pptx
@@ -10,13 +10,15 @@
     <p:sldId id="258" r:id="rId4"/>
     <p:sldId id="259" r:id="rId5"/>
     <p:sldId id="260" r:id="rId6"/>
-    <p:sldId id="261" r:id="rId7"/>
-    <p:sldId id="262" r:id="rId8"/>
-    <p:sldId id="263" r:id="rId9"/>
-    <p:sldId id="264" r:id="rId10"/>
-    <p:sldId id="265" r:id="rId11"/>
-    <p:sldId id="266" r:id="rId12"/>
-    <p:sldId id="267" r:id="rId13"/>
+    <p:sldId id="269" r:id="rId7"/>
+    <p:sldId id="261" r:id="rId8"/>
+    <p:sldId id="262" r:id="rId9"/>
+    <p:sldId id="263" r:id="rId10"/>
+    <p:sldId id="264" r:id="rId11"/>
+    <p:sldId id="268" r:id="rId12"/>
+    <p:sldId id="265" r:id="rId13"/>
+    <p:sldId id="266" r:id="rId14"/>
+    <p:sldId id="267" r:id="rId15"/>
   </p:sldIdLst>
   <p:sldSz cx="12192000" cy="6858000"/>
   <p:notesSz cx="6858000" cy="9144000"/>
@@ -3185,7 +3187,7 @@
           <a:p>
             <a:r>
               <a:rPr lang="en-US" dirty="0" smtClean="0"/>
-              <a:t>Transport &lt;- Bus</a:t>
+              <a:t>Social &lt;- Societies</a:t>
             </a:r>
             <a:endParaRPr lang="en-US" dirty="0"/>
           </a:p>
@@ -3201,39 +3203,63 @@
             <p:ph idx="1"/>
           </p:nvPr>
         </p:nvSpPr>
-        <p:spPr/>
+        <p:spPr>
+          <a:xfrm>
+            <a:off x="86033" y="1696974"/>
+            <a:ext cx="3453581" cy="4351338"/>
+          </a:xfrm>
+        </p:spPr>
         <p:txBody>
           <a:bodyPr>
-            <a:noAutofit/>
+            <a:normAutofit/>
           </a:bodyPr>
           <a:lstStyle/>
           <a:p>
-            <a:pPr>
-              <a:buFontTx/>
-              <a:buChar char="-"/>
+            <a:pPr marL="0" indent="0">
+              <a:buNone/>
             </a:pPr>
             <a:r>
               <a:rPr lang="en-US" sz="2200" dirty="0" smtClean="0"/>
-              <a:t>Help users find estimated arrival time of bus route 91 and 91M at UST north gate / south gate based on current time</a:t>
-            </a:r>
-          </a:p>
-          <a:p>
-            <a:pPr>
-              <a:buFontTx/>
-              <a:buChar char="-"/>
-            </a:pPr>
-            <a:r>
-              <a:rPr lang="en-US" sz="2200" dirty="0" smtClean="0"/>
-              <a:t>Arrival time are crawled from official KMB database</a:t>
+              <a:t>-  Help users find webpages of UST societies, e.g. Debating Society, Drama Society</a:t>
             </a:r>
             <a:endParaRPr lang="en-US" sz="2200" dirty="0"/>
           </a:p>
         </p:txBody>
       </p:sp>
+      <p:pic>
+        <p:nvPicPr>
+          <p:cNvPr id="4" name="Picture 3"/>
+          <p:cNvPicPr>
+            <a:picLocks noChangeAspect="1"/>
+          </p:cNvPicPr>
+          <p:nvPr/>
+        </p:nvPicPr>
+        <p:blipFill>
+          <a:blip r:embed="rId2">
+            <a:extLst>
+              <a:ext uri="{28A0092B-C50C-407E-A947-70E740481C1C}">
+                <a14:useLocalDpi xmlns:a14="http://schemas.microsoft.com/office/drawing/2010/main" val="0"/>
+              </a:ext>
+            </a:extLst>
+          </a:blip>
+          <a:stretch>
+            <a:fillRect/>
+          </a:stretch>
+        </p:blipFill>
+        <p:spPr>
+          <a:xfrm>
+            <a:off x="3539614" y="1388258"/>
+            <a:ext cx="8141110" cy="4942564"/>
+          </a:xfrm>
+          <a:prstGeom prst="rect">
+            <a:avLst/>
+          </a:prstGeom>
+        </p:spPr>
+      </p:pic>
     </p:spTree>
     <p:extLst>
       <p:ext uri="{BB962C8B-B14F-4D97-AF65-F5344CB8AC3E}">
-        <p14:creationId xmlns:p14="http://schemas.microsoft.com/office/powerpoint/2010/main" val="376304718"/>
+        <p14:creationId xmlns:p14="http://schemas.microsoft.com/office/powerpoint/2010/main" val="1745196096"/>
       </p:ext>
     </p:extLst>
   </p:cSld>
@@ -3260,6 +3286,66 @@
           <a:chExt cx="0" cy="0"/>
         </a:xfrm>
       </p:grpSpPr>
+      <p:pic>
+        <p:nvPicPr>
+          <p:cNvPr id="4" name="Picture 3"/>
+          <p:cNvPicPr>
+            <a:picLocks noChangeAspect="1"/>
+          </p:cNvPicPr>
+          <p:nvPr/>
+        </p:nvPicPr>
+        <p:blipFill>
+          <a:blip r:embed="rId2">
+            <a:extLst>
+              <a:ext uri="{28A0092B-C50C-407E-A947-70E740481C1C}">
+                <a14:useLocalDpi xmlns:a14="http://schemas.microsoft.com/office/drawing/2010/main" val="0"/>
+              </a:ext>
+            </a:extLst>
+          </a:blip>
+          <a:stretch>
+            <a:fillRect/>
+          </a:stretch>
+        </p:blipFill>
+        <p:spPr>
+          <a:xfrm>
+            <a:off x="1165122" y="1935726"/>
+            <a:ext cx="10058400" cy="2822644"/>
+          </a:xfrm>
+          <a:prstGeom prst="rect">
+            <a:avLst/>
+          </a:prstGeom>
+        </p:spPr>
+      </p:pic>
+    </p:spTree>
+    <p:extLst>
+      <p:ext uri="{BB962C8B-B14F-4D97-AF65-F5344CB8AC3E}">
+        <p14:creationId xmlns:p14="http://schemas.microsoft.com/office/powerpoint/2010/main" val="1021538547"/>
+      </p:ext>
+    </p:extLst>
+  </p:cSld>
+  <p:clrMapOvr>
+    <a:masterClrMapping/>
+  </p:clrMapOvr>
+</p:sld>
+</file>
+
+<file path=ppt/slides/slide12.xml><?xml version="1.0" encoding="utf-8"?>
+<p:sld xmlns:a="http://schemas.openxmlformats.org/drawingml/2006/main" xmlns:r="http://schemas.openxmlformats.org/officeDocument/2006/relationships" xmlns:p="http://schemas.openxmlformats.org/presentationml/2006/main">
+  <p:cSld>
+    <p:spTree>
+      <p:nvGrpSpPr>
+        <p:cNvPr id="1" name=""/>
+        <p:cNvGrpSpPr/>
+        <p:nvPr/>
+      </p:nvGrpSpPr>
+      <p:grpSpPr>
+        <a:xfrm>
+          <a:off x="0" y="0"/>
+          <a:ext cx="0" cy="0"/>
+          <a:chOff x="0" y="0"/>
+          <a:chExt cx="0" cy="0"/>
+        </a:xfrm>
+      </p:grpSpPr>
       <p:sp>
         <p:nvSpPr>
           <p:cNvPr id="2" name="Title 1"/>
@@ -3277,7 +3363,7 @@
           <a:p>
             <a:r>
               <a:rPr lang="en-US" dirty="0" smtClean="0"/>
-              <a:t>Transport &lt;- Minibus</a:t>
+              <a:t>Transport &lt;- Bus</a:t>
             </a:r>
             <a:endParaRPr lang="en-US" dirty="0"/>
           </a:p>
@@ -3296,7 +3382,7 @@
         <p:spPr/>
         <p:txBody>
           <a:bodyPr>
-            <a:normAutofit/>
+            <a:noAutofit/>
           </a:bodyPr>
           <a:lstStyle/>
           <a:p>
@@ -3306,7 +3392,7 @@
             </a:pPr>
             <a:r>
               <a:rPr lang="en-US" sz="2200" dirty="0" smtClean="0"/>
-              <a:t>Help users find estimated arrival time of minibus route 11 based on current time</a:t>
+              <a:t>Help users find estimated arrival time of bus route 91 and 91M at UST north gate / south gate based on current time</a:t>
             </a:r>
           </a:p>
           <a:p>
@@ -3316,12 +3402,188 @@
             </a:pPr>
             <a:r>
               <a:rPr lang="en-US" sz="2200" dirty="0" smtClean="0"/>
+              <a:t>Arrival time are crawled from official KMB database</a:t>
+            </a:r>
+            <a:endParaRPr lang="en-US" sz="2200" dirty="0"/>
+          </a:p>
+        </p:txBody>
+      </p:sp>
+      <p:pic>
+        <p:nvPicPr>
+          <p:cNvPr id="4" name="Picture 3"/>
+          <p:cNvPicPr>
+            <a:picLocks noChangeAspect="1"/>
+          </p:cNvPicPr>
+          <p:nvPr/>
+        </p:nvPicPr>
+        <p:blipFill>
+          <a:blip r:embed="rId2">
+            <a:extLst>
+              <a:ext uri="{28A0092B-C50C-407E-A947-70E740481C1C}">
+                <a14:useLocalDpi xmlns:a14="http://schemas.microsoft.com/office/drawing/2010/main" val="0"/>
+              </a:ext>
+            </a:extLst>
+          </a:blip>
+          <a:stretch>
+            <a:fillRect/>
+          </a:stretch>
+        </p:blipFill>
+        <p:spPr>
+          <a:xfrm>
+            <a:off x="1066800" y="3380536"/>
+            <a:ext cx="10058400" cy="2796427"/>
+          </a:xfrm>
+          <a:prstGeom prst="rect">
+            <a:avLst/>
+          </a:prstGeom>
+        </p:spPr>
+      </p:pic>
+    </p:spTree>
+    <p:extLst>
+      <p:ext uri="{BB962C8B-B14F-4D97-AF65-F5344CB8AC3E}">
+        <p14:creationId xmlns:p14="http://schemas.microsoft.com/office/powerpoint/2010/main" val="376304718"/>
+      </p:ext>
+    </p:extLst>
+  </p:cSld>
+  <p:clrMapOvr>
+    <a:masterClrMapping/>
+  </p:clrMapOvr>
+</p:sld>
+</file>
+
+<file path=ppt/slides/slide13.xml><?xml version="1.0" encoding="utf-8"?>
+<p:sld xmlns:a="http://schemas.openxmlformats.org/drawingml/2006/main" xmlns:r="http://schemas.openxmlformats.org/officeDocument/2006/relationships" xmlns:p="http://schemas.openxmlformats.org/presentationml/2006/main">
+  <p:cSld>
+    <p:spTree>
+      <p:nvGrpSpPr>
+        <p:cNvPr id="1" name=""/>
+        <p:cNvGrpSpPr/>
+        <p:nvPr/>
+      </p:nvGrpSpPr>
+      <p:grpSpPr>
+        <a:xfrm>
+          <a:off x="0" y="0"/>
+          <a:ext cx="0" cy="0"/>
+          <a:chOff x="0" y="0"/>
+          <a:chExt cx="0" cy="0"/>
+        </a:xfrm>
+      </p:grpSpPr>
+      <p:sp>
+        <p:nvSpPr>
+          <p:cNvPr id="2" name="Title 1"/>
+          <p:cNvSpPr>
+            <a:spLocks noGrp="1"/>
+          </p:cNvSpPr>
+          <p:nvPr>
+            <p:ph type="title"/>
+          </p:nvPr>
+        </p:nvSpPr>
+        <p:spPr/>
+        <p:txBody>
+          <a:bodyPr/>
+          <a:lstStyle/>
+          <a:p>
+            <a:r>
+              <a:rPr lang="en-US" dirty="0" smtClean="0"/>
+              <a:t>Transport &lt;- Minibus</a:t>
+            </a:r>
+            <a:endParaRPr lang="en-US" dirty="0"/>
+          </a:p>
+        </p:txBody>
+      </p:sp>
+      <p:sp>
+        <p:nvSpPr>
+          <p:cNvPr id="3" name="Content Placeholder 2"/>
+          <p:cNvSpPr>
+            <a:spLocks noGrp="1"/>
+          </p:cNvSpPr>
+          <p:nvPr>
+            <p:ph idx="1"/>
+          </p:nvPr>
+        </p:nvSpPr>
+        <p:spPr/>
+        <p:txBody>
+          <a:bodyPr>
+            <a:normAutofit/>
+          </a:bodyPr>
+          <a:lstStyle/>
+          <a:p>
+            <a:pPr>
+              <a:buFontTx/>
+              <a:buChar char="-"/>
+            </a:pPr>
+            <a:r>
+              <a:rPr lang="en-US" sz="2200" dirty="0" smtClean="0"/>
+              <a:t>Help users find estimated arrival time of minibus route 11 based on current time</a:t>
+            </a:r>
+          </a:p>
+          <a:p>
+            <a:pPr>
+              <a:buFontTx/>
+              <a:buChar char="-"/>
+            </a:pPr>
+            <a:r>
+              <a:rPr lang="en-US" sz="2200" dirty="0" smtClean="0"/>
               <a:t>Minibus records are self-collected</a:t>
             </a:r>
             <a:endParaRPr lang="en-US" sz="2200" dirty="0"/>
           </a:p>
         </p:txBody>
       </p:sp>
+      <p:pic>
+        <p:nvPicPr>
+          <p:cNvPr id="4" name="Picture 3"/>
+          <p:cNvPicPr>
+            <a:picLocks noChangeAspect="1"/>
+          </p:cNvPicPr>
+          <p:nvPr/>
+        </p:nvPicPr>
+        <p:blipFill>
+          <a:blip r:embed="rId2"/>
+          <a:stretch>
+            <a:fillRect/>
+          </a:stretch>
+        </p:blipFill>
+        <p:spPr>
+          <a:xfrm>
+            <a:off x="838200" y="3644672"/>
+            <a:ext cx="10186898" cy="706809"/>
+          </a:xfrm>
+          <a:prstGeom prst="rect">
+            <a:avLst/>
+          </a:prstGeom>
+        </p:spPr>
+      </p:pic>
+      <p:pic>
+        <p:nvPicPr>
+          <p:cNvPr id="5" name="Picture 4"/>
+          <p:cNvPicPr>
+            <a:picLocks noChangeAspect="1"/>
+          </p:cNvPicPr>
+          <p:nvPr/>
+        </p:nvPicPr>
+        <p:blipFill>
+          <a:blip r:embed="rId3">
+            <a:extLst>
+              <a:ext uri="{28A0092B-C50C-407E-A947-70E740481C1C}">
+                <a14:useLocalDpi xmlns:a14="http://schemas.microsoft.com/office/drawing/2010/main" val="0"/>
+              </a:ext>
+            </a:extLst>
+          </a:blip>
+          <a:stretch>
+            <a:fillRect/>
+          </a:stretch>
+        </p:blipFill>
+        <p:spPr>
+          <a:xfrm>
+            <a:off x="838199" y="4492852"/>
+            <a:ext cx="10186899" cy="698580"/>
+          </a:xfrm>
+          <a:prstGeom prst="rect">
+            <a:avLst/>
+          </a:prstGeom>
+        </p:spPr>
+      </p:pic>
     </p:spTree>
     <p:extLst>
       <p:ext uri="{BB962C8B-B14F-4D97-AF65-F5344CB8AC3E}">
@@ -3335,7 +3597,7 @@
 </p:sld>
 </file>
 
-<file path=ppt/slides/slide12.xml><?xml version="1.0" encoding="utf-8"?>
+<file path=ppt/slides/slide14.xml><?xml version="1.0" encoding="utf-8"?>
 <p:sld xmlns:a="http://schemas.openxmlformats.org/drawingml/2006/main" xmlns:r="http://schemas.openxmlformats.org/officeDocument/2006/relationships" xmlns:p="http://schemas.openxmlformats.org/presentationml/2006/main">
   <p:cSld>
     <p:spTree>
@@ -3490,7 +3752,7 @@
               <a:buNone/>
             </a:pPr>
             <a:r>
-              <a:rPr lang="en-US" sz="1600" i="1" dirty="0" smtClean="0"/>
+              <a:rPr lang="en-US" sz="1400" i="1" dirty="0" smtClean="0"/>
               <a:t>Category</a:t>
             </a:r>
           </a:p>
@@ -3499,15 +3761,15 @@
               <a:buNone/>
             </a:pPr>
             <a:r>
-              <a:rPr lang="en-US" sz="1600" dirty="0"/>
+              <a:rPr lang="en-US" sz="1400" dirty="0"/>
               <a:t> </a:t>
             </a:r>
             <a:r>
-              <a:rPr lang="en-US" sz="1600" dirty="0" smtClean="0"/>
+              <a:rPr lang="en-US" sz="1400" dirty="0" smtClean="0"/>
               <a:t>                &lt;- </a:t>
             </a:r>
             <a:r>
-              <a:rPr lang="en-US" sz="1600" i="1" dirty="0" smtClean="0"/>
+              <a:rPr lang="en-US" sz="1400" i="1" dirty="0" smtClean="0"/>
               <a:t>Academic</a:t>
             </a:r>
           </a:p>
@@ -3516,11 +3778,11 @@
               <a:buNone/>
             </a:pPr>
             <a:r>
-              <a:rPr lang="en-US" sz="1600" dirty="0"/>
+              <a:rPr lang="en-US" sz="1400" dirty="0"/>
               <a:t> </a:t>
             </a:r>
             <a:r>
-              <a:rPr lang="en-US" sz="1600" dirty="0" smtClean="0"/>
+              <a:rPr lang="en-US" sz="1400" dirty="0" smtClean="0"/>
               <a:t>                                       &lt;- Course</a:t>
             </a:r>
           </a:p>
@@ -3529,51 +3791,64 @@
               <a:buNone/>
             </a:pPr>
             <a:r>
-              <a:rPr lang="en-US" sz="1600" dirty="0"/>
+              <a:rPr lang="en-US" sz="1400" dirty="0"/>
               <a:t> </a:t>
             </a:r>
             <a:r>
-              <a:rPr lang="en-US" sz="1600" dirty="0" smtClean="0"/>
+              <a:rPr lang="en-US" sz="1400" dirty="0" smtClean="0"/>
               <a:t>                                       &lt;- </a:t>
             </a:r>
             <a:r>
-              <a:rPr lang="en-US" sz="1600" dirty="0" err="1" smtClean="0"/>
+              <a:rPr lang="en-US" sz="1400" dirty="0" err="1" smtClean="0"/>
               <a:t>CourseWebsiteSearch</a:t>
             </a:r>
-            <a:endParaRPr lang="en-US" sz="1600" dirty="0" smtClean="0"/>
+            <a:endParaRPr lang="en-US" sz="1400" dirty="0" smtClean="0"/>
           </a:p>
           <a:p>
             <a:pPr marL="0" indent="0">
               <a:buNone/>
             </a:pPr>
             <a:r>
-              <a:rPr lang="en-US" sz="1600" dirty="0"/>
+              <a:rPr lang="en-US" sz="1400" dirty="0"/>
               <a:t> </a:t>
             </a:r>
             <a:r>
-              <a:rPr lang="en-US" sz="1600" dirty="0" smtClean="0"/>
+              <a:rPr lang="en-US" sz="1400" dirty="0" smtClean="0"/>
               <a:t>                                       &lt;- </a:t>
             </a:r>
             <a:r>
-              <a:rPr lang="en-US" sz="1600" dirty="0" err="1" smtClean="0"/>
+              <a:rPr lang="en-US" sz="1400" dirty="0" err="1" smtClean="0"/>
               <a:t>CreditTransfer</a:t>
             </a:r>
-            <a:endParaRPr lang="en-US" sz="1600" dirty="0" smtClean="0"/>
+            <a:endParaRPr lang="en-US" sz="1400" dirty="0" smtClean="0"/>
           </a:p>
           <a:p>
             <a:pPr marL="0" indent="0">
               <a:buNone/>
             </a:pPr>
             <a:r>
-              <a:rPr lang="en-US" sz="1600" dirty="0"/>
+              <a:rPr lang="en-US" sz="1400" dirty="0"/>
               <a:t> </a:t>
             </a:r>
             <a:r>
-              <a:rPr lang="en-US" sz="1600" dirty="0" smtClean="0"/>
+              <a:rPr lang="en-US" sz="1400" dirty="0" smtClean="0"/>
+              <a:t>                                       &lt;- Staff</a:t>
+            </a:r>
+          </a:p>
+          <a:p>
+            <a:pPr marL="0" indent="0">
+              <a:buNone/>
+            </a:pPr>
+            <a:r>
+              <a:rPr lang="en-US" sz="1400" dirty="0"/>
+              <a:t> </a:t>
+            </a:r>
+            <a:r>
+              <a:rPr lang="en-US" sz="1400" dirty="0" smtClean="0"/>
               <a:t>                &lt;- </a:t>
             </a:r>
             <a:r>
-              <a:rPr lang="en-US" sz="1600" i="1" dirty="0" smtClean="0"/>
+              <a:rPr lang="en-US" sz="1400" i="1" dirty="0" smtClean="0"/>
               <a:t>Campus</a:t>
             </a:r>
           </a:p>
@@ -3582,33 +3857,33 @@
               <a:buNone/>
             </a:pPr>
             <a:r>
-              <a:rPr lang="en-US" sz="1600" dirty="0"/>
+              <a:rPr lang="en-US" sz="1400" dirty="0"/>
               <a:t> </a:t>
             </a:r>
             <a:r>
-              <a:rPr lang="en-US" sz="1600" dirty="0" smtClean="0"/>
+              <a:rPr lang="en-US" sz="1400" dirty="0" smtClean="0"/>
               <a:t>                                       &lt;- </a:t>
             </a:r>
             <a:r>
-              <a:rPr lang="en-US" sz="1600" dirty="0" err="1" smtClean="0"/>
+              <a:rPr lang="en-US" sz="1400" dirty="0" err="1" smtClean="0"/>
               <a:t>CampusETA</a:t>
             </a:r>
-            <a:endParaRPr lang="en-US" sz="1600" dirty="0" smtClean="0"/>
+            <a:endParaRPr lang="en-US" sz="1400" dirty="0" smtClean="0"/>
           </a:p>
           <a:p>
             <a:pPr marL="0" indent="0">
               <a:buNone/>
             </a:pPr>
             <a:r>
-              <a:rPr lang="en-US" sz="1600" dirty="0"/>
+              <a:rPr lang="en-US" sz="1400" dirty="0"/>
               <a:t> </a:t>
             </a:r>
             <a:r>
-              <a:rPr lang="en-US" sz="1600" dirty="0" smtClean="0"/>
+              <a:rPr lang="en-US" sz="1400" dirty="0" smtClean="0"/>
               <a:t>                &lt;- </a:t>
             </a:r>
             <a:r>
-              <a:rPr lang="en-US" sz="1600" i="1" dirty="0" smtClean="0"/>
+              <a:rPr lang="en-US" sz="1400" i="1" dirty="0" smtClean="0"/>
               <a:t>Function</a:t>
             </a:r>
           </a:p>
@@ -3617,33 +3892,33 @@
               <a:buNone/>
             </a:pPr>
             <a:r>
-              <a:rPr lang="en-US" sz="1600" dirty="0"/>
+              <a:rPr lang="en-US" sz="1400" dirty="0"/>
               <a:t> </a:t>
             </a:r>
             <a:r>
-              <a:rPr lang="en-US" sz="1600" dirty="0" smtClean="0"/>
+              <a:rPr lang="en-US" sz="1400" dirty="0" smtClean="0"/>
               <a:t>                                       &lt;- </a:t>
             </a:r>
             <a:r>
-              <a:rPr lang="en-US" sz="1600" dirty="0" err="1" smtClean="0"/>
+              <a:rPr lang="en-US" sz="1400" dirty="0" err="1" smtClean="0"/>
               <a:t>TimeTable</a:t>
             </a:r>
-            <a:endParaRPr lang="en-US" sz="1600" dirty="0" smtClean="0"/>
+            <a:endParaRPr lang="en-US" sz="1400" dirty="0" smtClean="0"/>
           </a:p>
           <a:p>
             <a:pPr marL="0" indent="0">
               <a:buNone/>
             </a:pPr>
             <a:r>
-              <a:rPr lang="en-US" sz="1600" dirty="0"/>
+              <a:rPr lang="en-US" sz="1400" dirty="0"/>
               <a:t> </a:t>
             </a:r>
             <a:r>
-              <a:rPr lang="en-US" sz="1600" dirty="0" smtClean="0"/>
+              <a:rPr lang="en-US" sz="1400" dirty="0" smtClean="0"/>
               <a:t>                &lt;- </a:t>
             </a:r>
             <a:r>
-              <a:rPr lang="en-US" sz="1600" i="1" dirty="0" smtClean="0"/>
+              <a:rPr lang="en-US" sz="1400" i="1" dirty="0" smtClean="0"/>
               <a:t>Social</a:t>
             </a:r>
           </a:p>
@@ -3652,11 +3927,11 @@
               <a:buNone/>
             </a:pPr>
             <a:r>
-              <a:rPr lang="en-US" sz="1600" dirty="0"/>
+              <a:rPr lang="en-US" sz="1400" dirty="0"/>
               <a:t> </a:t>
             </a:r>
             <a:r>
-              <a:rPr lang="en-US" sz="1600" dirty="0" smtClean="0"/>
+              <a:rPr lang="en-US" sz="1400" dirty="0" smtClean="0"/>
               <a:t>                                       &lt;- Recreation</a:t>
             </a:r>
           </a:p>
@@ -3665,11 +3940,11 @@
               <a:buNone/>
             </a:pPr>
             <a:r>
-              <a:rPr lang="en-US" sz="1600" dirty="0"/>
+              <a:rPr lang="en-US" sz="1400" dirty="0"/>
               <a:t> </a:t>
             </a:r>
             <a:r>
-              <a:rPr lang="en-US" sz="1600" dirty="0" smtClean="0"/>
+              <a:rPr lang="en-US" sz="1400" dirty="0" smtClean="0"/>
               <a:t>                                       &lt;- Societies</a:t>
             </a:r>
           </a:p>
@@ -3678,15 +3953,15 @@
               <a:buNone/>
             </a:pPr>
             <a:r>
-              <a:rPr lang="en-US" sz="1600" dirty="0"/>
+              <a:rPr lang="en-US" sz="1400" dirty="0"/>
               <a:t> </a:t>
             </a:r>
             <a:r>
-              <a:rPr lang="en-US" sz="1600" dirty="0" smtClean="0"/>
+              <a:rPr lang="en-US" sz="1400" dirty="0" smtClean="0"/>
               <a:t>                &lt;- </a:t>
             </a:r>
             <a:r>
-              <a:rPr lang="en-US" sz="1600" i="1" dirty="0" smtClean="0"/>
+              <a:rPr lang="en-US" sz="1400" i="1" dirty="0" smtClean="0"/>
               <a:t>Transport</a:t>
             </a:r>
           </a:p>
@@ -3695,11 +3970,11 @@
               <a:buNone/>
             </a:pPr>
             <a:r>
-              <a:rPr lang="en-US" sz="1600" dirty="0"/>
+              <a:rPr lang="en-US" sz="1400" dirty="0"/>
               <a:t> </a:t>
             </a:r>
             <a:r>
-              <a:rPr lang="en-US" sz="1600" dirty="0" smtClean="0"/>
+              <a:rPr lang="en-US" sz="1400" dirty="0" smtClean="0"/>
               <a:t>                                       &lt;- Bus</a:t>
             </a:r>
           </a:p>
@@ -3708,11 +3983,11 @@
               <a:buNone/>
             </a:pPr>
             <a:r>
-              <a:rPr lang="en-US" sz="1600" dirty="0"/>
+              <a:rPr lang="en-US" sz="1400" dirty="0"/>
               <a:t> </a:t>
             </a:r>
             <a:r>
-              <a:rPr lang="en-US" sz="1600" dirty="0" smtClean="0"/>
+              <a:rPr lang="en-US" sz="1400" dirty="0" smtClean="0"/>
               <a:t>                                       &lt;- Minibus</a:t>
             </a:r>
           </a:p>
@@ -3721,18 +3996,14 @@
               <a:buNone/>
             </a:pPr>
             <a:r>
-              <a:rPr lang="en-US" sz="1600" dirty="0"/>
+              <a:rPr lang="en-US" sz="1400" dirty="0"/>
               <a:t> </a:t>
             </a:r>
             <a:r>
-              <a:rPr lang="en-US" sz="1600" dirty="0" smtClean="0"/>
-              <a:t>                &lt;- </a:t>
-            </a:r>
-            <a:r>
-              <a:rPr lang="en-US" sz="1600" i="1" dirty="0" smtClean="0"/>
-              <a:t>Instruction</a:t>
-            </a:r>
-            <a:endParaRPr lang="en-US" sz="1600" i="1" dirty="0"/>
+              <a:rPr lang="en-US" sz="1400" dirty="0" smtClean="0"/>
+              <a:t>                &lt;- Instruction</a:t>
+            </a:r>
+            <a:endParaRPr lang="en-US" sz="1400" dirty="0"/>
           </a:p>
         </p:txBody>
       </p:sp>
@@ -4069,11 +4340,7 @@
           <a:p>
             <a:r>
               <a:rPr lang="en-US" dirty="0" smtClean="0"/>
-              <a:t>Campus &lt;- </a:t>
-            </a:r>
-            <a:r>
-              <a:rPr lang="en-US" dirty="0" err="1" smtClean="0"/>
-              <a:t>CampusETA</a:t>
+              <a:t>Academic &lt;- Staff</a:t>
             </a:r>
             <a:endParaRPr lang="en-US" dirty="0"/>
           </a:p>
@@ -4089,47 +4356,63 @@
             <p:ph idx="1"/>
           </p:nvPr>
         </p:nvSpPr>
-        <p:spPr/>
-        <p:txBody>
-          <a:bodyPr/>
-          <a:lstStyle/>
-          <a:p>
-            <a:pPr>
-              <a:buFontTx/>
-              <a:buChar char="-"/>
+        <p:spPr>
+          <a:xfrm>
+            <a:off x="838200" y="1825625"/>
+            <a:ext cx="2362200" cy="4351338"/>
+          </a:xfrm>
+        </p:spPr>
+        <p:txBody>
+          <a:bodyPr>
+            <a:normAutofit/>
+          </a:bodyPr>
+          <a:lstStyle/>
+          <a:p>
+            <a:pPr marL="0" indent="0">
+              <a:buNone/>
             </a:pPr>
             <a:r>
               <a:rPr lang="en-US" sz="2200" dirty="0" smtClean="0"/>
-              <a:t>Help users estimate the arrival time from one location to another throughout the UST campus</a:t>
-            </a:r>
-          </a:p>
-          <a:p>
-            <a:pPr>
-              <a:buFontTx/>
-              <a:buChar char="-"/>
-            </a:pPr>
-            <a:r>
-              <a:rPr lang="en-US" sz="2200" dirty="0" smtClean="0"/>
-              <a:t>Data crawled from </a:t>
-            </a:r>
-            <a:r>
-              <a:rPr lang="en-US" sz="2200" dirty="0" err="1" smtClean="0"/>
-              <a:t>pathadvisor.ust.hk</a:t>
-            </a:r>
-            <a:endParaRPr lang="en-US" sz="2200" dirty="0" smtClean="0"/>
-          </a:p>
-          <a:p>
-            <a:pPr marL="0" indent="0">
-              <a:buNone/>
-            </a:pPr>
-            <a:endParaRPr lang="en-US" dirty="0"/>
-          </a:p>
-        </p:txBody>
-      </p:sp>
+              <a:t>- Help users find the office location, contact info of professor / TA </a:t>
+            </a:r>
+            <a:endParaRPr lang="en-US" sz="2200" dirty="0"/>
+          </a:p>
+        </p:txBody>
+      </p:sp>
+      <p:pic>
+        <p:nvPicPr>
+          <p:cNvPr id="4" name="Picture 3"/>
+          <p:cNvPicPr>
+            <a:picLocks noChangeAspect="1"/>
+          </p:cNvPicPr>
+          <p:nvPr/>
+        </p:nvPicPr>
+        <p:blipFill>
+          <a:blip r:embed="rId2">
+            <a:extLst>
+              <a:ext uri="{28A0092B-C50C-407E-A947-70E740481C1C}">
+                <a14:useLocalDpi xmlns:a14="http://schemas.microsoft.com/office/drawing/2010/main" val="0"/>
+              </a:ext>
+            </a:extLst>
+          </a:blip>
+          <a:stretch>
+            <a:fillRect/>
+          </a:stretch>
+        </p:blipFill>
+        <p:spPr>
+          <a:xfrm>
+            <a:off x="3370826" y="1330389"/>
+            <a:ext cx="8139901" cy="5341809"/>
+          </a:xfrm>
+          <a:prstGeom prst="rect">
+            <a:avLst/>
+          </a:prstGeom>
+        </p:spPr>
+      </p:pic>
     </p:spTree>
     <p:extLst>
       <p:ext uri="{BB962C8B-B14F-4D97-AF65-F5344CB8AC3E}">
-        <p14:creationId xmlns:p14="http://schemas.microsoft.com/office/powerpoint/2010/main" val="573443704"/>
+        <p14:creationId xmlns:p14="http://schemas.microsoft.com/office/powerpoint/2010/main" val="1290483773"/>
       </p:ext>
     </p:extLst>
   </p:cSld>
@@ -4173,11 +4456,11 @@
           <a:p>
             <a:r>
               <a:rPr lang="en-US" dirty="0" smtClean="0"/>
-              <a:t>Function &lt;- </a:t>
+              <a:t>Campus &lt;- </a:t>
             </a:r>
             <a:r>
               <a:rPr lang="en-US" dirty="0" err="1" smtClean="0"/>
-              <a:t>TimeTable</a:t>
+              <a:t>CampusETA</a:t>
             </a:r>
             <a:endParaRPr lang="en-US" dirty="0"/>
           </a:p>
@@ -4195,26 +4478,75 @@
         </p:nvSpPr>
         <p:spPr/>
         <p:txBody>
-          <a:bodyPr>
-            <a:normAutofit/>
-          </a:bodyPr>
-          <a:lstStyle/>
+          <a:bodyPr/>
+          <a:lstStyle/>
+          <a:p>
+            <a:pPr>
+              <a:buFontTx/>
+              <a:buChar char="-"/>
+            </a:pPr>
+            <a:r>
+              <a:rPr lang="en-US" sz="2200" dirty="0" smtClean="0"/>
+              <a:t>Help users estimate the arrival time from one location to another throughout the UST campus</a:t>
+            </a:r>
+          </a:p>
+          <a:p>
+            <a:pPr>
+              <a:buFontTx/>
+              <a:buChar char="-"/>
+            </a:pPr>
+            <a:r>
+              <a:rPr lang="en-US" sz="2200" dirty="0" smtClean="0"/>
+              <a:t>Data crawled from </a:t>
+            </a:r>
+            <a:r>
+              <a:rPr lang="en-US" sz="2200" dirty="0" err="1" smtClean="0"/>
+              <a:t>pathadvisor.ust.hk</a:t>
+            </a:r>
+            <a:endParaRPr lang="en-US" sz="2200" dirty="0" smtClean="0"/>
+          </a:p>
           <a:p>
             <a:pPr marL="0" indent="0">
               <a:buNone/>
             </a:pPr>
-            <a:r>
-              <a:rPr lang="en-US" sz="2200" dirty="0" smtClean="0"/>
-              <a:t>- Assist users to manage their time effectively </a:t>
-            </a:r>
-            <a:endParaRPr lang="en-US" sz="2200" dirty="0"/>
-          </a:p>
-        </p:txBody>
-      </p:sp>
+            <a:endParaRPr lang="en-US" dirty="0"/>
+          </a:p>
+        </p:txBody>
+      </p:sp>
+      <p:pic>
+        <p:nvPicPr>
+          <p:cNvPr id="4" name="Picture 3"/>
+          <p:cNvPicPr>
+            <a:picLocks noChangeAspect="1"/>
+          </p:cNvPicPr>
+          <p:nvPr/>
+        </p:nvPicPr>
+        <p:blipFill>
+          <a:blip r:embed="rId2">
+            <a:extLst>
+              <a:ext uri="{28A0092B-C50C-407E-A947-70E740481C1C}">
+                <a14:useLocalDpi xmlns:a14="http://schemas.microsoft.com/office/drawing/2010/main" val="0"/>
+              </a:ext>
+            </a:extLst>
+          </a:blip>
+          <a:stretch>
+            <a:fillRect/>
+          </a:stretch>
+        </p:blipFill>
+        <p:spPr>
+          <a:xfrm>
+            <a:off x="1066800" y="2934519"/>
+            <a:ext cx="10058400" cy="3533559"/>
+          </a:xfrm>
+          <a:prstGeom prst="rect">
+            <a:avLst/>
+          </a:prstGeom>
+        </p:spPr>
+      </p:pic>
     </p:spTree>
     <p:extLst>
       <p:ext uri="{BB962C8B-B14F-4D97-AF65-F5344CB8AC3E}">
-        <p14:creationId xmlns:p14="http://schemas.microsoft.com/office/powerpoint/2010/main" val="116489300"/>
+        <p14:creationId xmlns:p14="http://schemas.microsoft.com/office/powerpoint/2010/main" val="573443704"/>
       </p:ext>
     </p:extLst>
   </p:cSld>
@@ -4258,7 +4590,11 @@
           <a:p>
             <a:r>
               <a:rPr lang="en-US" dirty="0" smtClean="0"/>
-              <a:t>Social &lt;- Recreation</a:t>
+              <a:t>Function &lt;- </a:t>
+            </a:r>
+            <a:r>
+              <a:rPr lang="en-US" dirty="0" err="1" smtClean="0"/>
+              <a:t>TimeTable</a:t>
             </a:r>
             <a:endParaRPr lang="en-US" dirty="0"/>
           </a:p>
@@ -4276,38 +4612,26 @@
         </p:nvSpPr>
         <p:spPr/>
         <p:txBody>
-          <a:bodyPr/>
-          <a:lstStyle/>
-          <a:p>
-            <a:pPr>
-              <a:buFontTx/>
-              <a:buChar char="-"/>
+          <a:bodyPr>
+            <a:normAutofit/>
+          </a:bodyPr>
+          <a:lstStyle/>
+          <a:p>
+            <a:pPr marL="0" indent="0">
+              <a:buNone/>
             </a:pPr>
             <a:r>
               <a:rPr lang="en-US" sz="2200" dirty="0" smtClean="0"/>
-              <a:t>Help users search </a:t>
-            </a:r>
-            <a:r>
-              <a:rPr lang="en-US" sz="2200" dirty="0" smtClean="0"/>
-              <a:t>websites for booking UST </a:t>
-            </a:r>
-            <a:r>
-              <a:rPr lang="en-US" sz="2200" dirty="0" smtClean="0"/>
-              <a:t>amenities, e.g. library study room, music room</a:t>
-            </a:r>
-          </a:p>
-          <a:p>
-            <a:pPr marL="0" indent="0">
-              <a:buNone/>
-            </a:pPr>
-            <a:endParaRPr lang="en-US" dirty="0"/>
+              <a:t>- Assist users to manage their time effectively </a:t>
+            </a:r>
+            <a:endParaRPr lang="en-US" sz="2200" dirty="0"/>
           </a:p>
         </p:txBody>
       </p:sp>
     </p:spTree>
     <p:extLst>
       <p:ext uri="{BB962C8B-B14F-4D97-AF65-F5344CB8AC3E}">
-        <p14:creationId xmlns:p14="http://schemas.microsoft.com/office/powerpoint/2010/main" val="1478062683"/>
+        <p14:creationId xmlns:p14="http://schemas.microsoft.com/office/powerpoint/2010/main" val="116489300"/>
       </p:ext>
     </p:extLst>
   </p:cSld>
@@ -4351,7 +4675,7 @@
           <a:p>
             <a:r>
               <a:rPr lang="en-US" dirty="0" smtClean="0"/>
-              <a:t>Social &lt;- Societies</a:t>
+              <a:t>Social &lt;- Recreation</a:t>
             </a:r>
             <a:endParaRPr lang="en-US" dirty="0"/>
           </a:p>
@@ -4367,32 +4691,67 @@
             <p:ph idx="1"/>
           </p:nvPr>
         </p:nvSpPr>
-        <p:spPr/>
-        <p:txBody>
-          <a:bodyPr>
-            <a:normAutofit/>
-          </a:bodyPr>
-          <a:lstStyle/>
+        <p:spPr>
+          <a:xfrm>
+            <a:off x="233517" y="1825625"/>
+            <a:ext cx="3483077" cy="4351338"/>
+          </a:xfrm>
+        </p:spPr>
+        <p:txBody>
+          <a:bodyPr/>
+          <a:lstStyle/>
+          <a:p>
+            <a:pPr>
+              <a:buFontTx/>
+              <a:buChar char="-"/>
+            </a:pPr>
+            <a:r>
+              <a:rPr lang="en-US" sz="2200" dirty="0" smtClean="0"/>
+              <a:t>Help users search websites for booking UST amenities, e.g. library study room, music room</a:t>
+            </a:r>
+          </a:p>
           <a:p>
             <a:pPr marL="0" indent="0">
               <a:buNone/>
             </a:pPr>
-            <a:r>
-              <a:rPr lang="en-US" sz="2200" dirty="0" smtClean="0"/>
-              <a:t>-  Help users </a:t>
-            </a:r>
-            <a:r>
-              <a:rPr lang="en-US" sz="2200" dirty="0" smtClean="0"/>
-              <a:t>find webpages of UST societies, e.g. Debating Society, Drama Society</a:t>
-            </a:r>
-            <a:endParaRPr lang="en-US" sz="2200" dirty="0"/>
-          </a:p>
-        </p:txBody>
-      </p:sp>
+            <a:endParaRPr lang="en-US" dirty="0"/>
+          </a:p>
+        </p:txBody>
+      </p:sp>
+      <p:pic>
+        <p:nvPicPr>
+          <p:cNvPr id="4" name="Picture 3"/>
+          <p:cNvPicPr>
+            <a:picLocks noChangeAspect="1"/>
+          </p:cNvPicPr>
+          <p:nvPr/>
+        </p:nvPicPr>
+        <p:blipFill>
+          <a:blip r:embed="rId2">
+            <a:extLst>
+              <a:ext uri="{28A0092B-C50C-407E-A947-70E740481C1C}">
+                <a14:useLocalDpi xmlns:a14="http://schemas.microsoft.com/office/drawing/2010/main" val="0"/>
+              </a:ext>
+            </a:extLst>
+          </a:blip>
+          <a:stretch>
+            <a:fillRect/>
+          </a:stretch>
+        </p:blipFill>
+        <p:spPr>
+          <a:xfrm>
+            <a:off x="3872014" y="1580841"/>
+            <a:ext cx="8076019" cy="4923197"/>
+          </a:xfrm>
+          <a:prstGeom prst="rect">
+            <a:avLst/>
+          </a:prstGeom>
+        </p:spPr>
+      </p:pic>
     </p:spTree>
     <p:extLst>
       <p:ext uri="{BB962C8B-B14F-4D97-AF65-F5344CB8AC3E}">
-        <p14:creationId xmlns:p14="http://schemas.microsoft.com/office/powerpoint/2010/main" val="1745196096"/>
+        <p14:creationId xmlns:p14="http://schemas.microsoft.com/office/powerpoint/2010/main" val="1478062683"/>
       </p:ext>
     </p:extLst>
   </p:cSld>

</xml_diff>

<commit_message>
described design patterns used, algorithms / libraries used, difficulties
</commit_message>
<xml_diff>
--- a/Presentation/COMP3111 Presentation.pptx
+++ b/Presentation/COMP3111 Presentation.pptx
@@ -19,6 +19,10 @@
     <p:sldId id="265" r:id="rId13"/>
     <p:sldId id="266" r:id="rId14"/>
     <p:sldId id="267" r:id="rId15"/>
+    <p:sldId id="271" r:id="rId16"/>
+    <p:sldId id="272" r:id="rId17"/>
+    <p:sldId id="270" r:id="rId18"/>
+    <p:sldId id="273" r:id="rId19"/>
   </p:sldIdLst>
   <p:sldSz cx="12192000" cy="6858000"/>
   <p:notesSz cx="6858000" cy="9144000"/>
@@ -3682,6 +3686,528 @@
 </p:sld>
 </file>
 
+<file path=ppt/slides/slide15.xml><?xml version="1.0" encoding="utf-8"?>
+<p:sld xmlns:a="http://schemas.openxmlformats.org/drawingml/2006/main" xmlns:r="http://schemas.openxmlformats.org/officeDocument/2006/relationships" xmlns:p="http://schemas.openxmlformats.org/presentationml/2006/main">
+  <p:cSld>
+    <p:spTree>
+      <p:nvGrpSpPr>
+        <p:cNvPr id="1" name=""/>
+        <p:cNvGrpSpPr/>
+        <p:nvPr/>
+      </p:nvGrpSpPr>
+      <p:grpSpPr>
+        <a:xfrm>
+          <a:off x="0" y="0"/>
+          <a:ext cx="0" cy="0"/>
+          <a:chOff x="0" y="0"/>
+          <a:chExt cx="0" cy="0"/>
+        </a:xfrm>
+      </p:grpSpPr>
+      <p:sp>
+        <p:nvSpPr>
+          <p:cNvPr id="2" name="Title 1"/>
+          <p:cNvSpPr>
+            <a:spLocks noGrp="1"/>
+          </p:cNvSpPr>
+          <p:nvPr>
+            <p:ph type="title"/>
+          </p:nvPr>
+        </p:nvSpPr>
+        <p:spPr/>
+        <p:txBody>
+          <a:bodyPr/>
+          <a:lstStyle/>
+          <a:p>
+            <a:r>
+              <a:rPr lang="en-US" dirty="0" smtClean="0"/>
+              <a:t>Design Pattern</a:t>
+            </a:r>
+            <a:endParaRPr lang="en-US" dirty="0"/>
+          </a:p>
+        </p:txBody>
+      </p:sp>
+      <p:sp>
+        <p:nvSpPr>
+          <p:cNvPr id="3" name="Content Placeholder 2"/>
+          <p:cNvSpPr>
+            <a:spLocks noGrp="1"/>
+          </p:cNvSpPr>
+          <p:nvPr>
+            <p:ph idx="1"/>
+          </p:nvPr>
+        </p:nvSpPr>
+        <p:spPr/>
+        <p:txBody>
+          <a:bodyPr>
+            <a:normAutofit lnSpcReduction="10000"/>
+          </a:bodyPr>
+          <a:lstStyle/>
+          <a:p>
+            <a:pPr>
+              <a:buFontTx/>
+              <a:buChar char="-"/>
+            </a:pPr>
+            <a:r>
+              <a:rPr lang="en-US" dirty="0" smtClean="0"/>
+              <a:t>Mediator</a:t>
+            </a:r>
+          </a:p>
+          <a:p>
+            <a:pPr>
+              <a:buFont typeface="Arial" charset="0"/>
+              <a:buChar char="•"/>
+            </a:pPr>
+            <a:r>
+              <a:rPr lang="en-US" dirty="0" smtClean="0"/>
+              <a:t>Each category has different functionalities</a:t>
+            </a:r>
+          </a:p>
+          <a:p>
+            <a:pPr>
+              <a:buFont typeface="Arial" charset="0"/>
+              <a:buChar char="•"/>
+            </a:pPr>
+            <a:r>
+              <a:rPr lang="en-US" dirty="0" smtClean="0"/>
+              <a:t>The Category class wraps all subcategories into a whole</a:t>
+            </a:r>
+          </a:p>
+          <a:p>
+            <a:pPr>
+              <a:buFont typeface="Symbol" charset="2"/>
+              <a:buChar char="Þ"/>
+            </a:pPr>
+            <a:r>
+              <a:rPr lang="en-US" dirty="0" smtClean="0"/>
+              <a:t> better maintenance</a:t>
+            </a:r>
+          </a:p>
+          <a:p>
+            <a:pPr>
+              <a:buFontTx/>
+              <a:buChar char="-"/>
+            </a:pPr>
+            <a:r>
+              <a:rPr lang="en-US" dirty="0" smtClean="0"/>
+              <a:t>Marker interface</a:t>
+            </a:r>
+          </a:p>
+          <a:p>
+            <a:pPr>
+              <a:buFont typeface="Arial" charset="0"/>
+              <a:buChar char="•"/>
+            </a:pPr>
+            <a:r>
+              <a:rPr lang="en-US" dirty="0" smtClean="0"/>
+              <a:t>Mimic </a:t>
+            </a:r>
+            <a:r>
+              <a:rPr lang="en-US" dirty="0" err="1" smtClean="0"/>
+              <a:t>java.lang.Serializable</a:t>
+            </a:r>
+            <a:r>
+              <a:rPr lang="en-US" dirty="0" smtClean="0"/>
+              <a:t> and </a:t>
+            </a:r>
+            <a:r>
+              <a:rPr lang="en-US" dirty="0" err="1" smtClean="0"/>
+              <a:t>java.lang.Clonable</a:t>
+            </a:r>
+            <a:endParaRPr lang="en-US" dirty="0" smtClean="0"/>
+          </a:p>
+          <a:p>
+            <a:pPr>
+              <a:buFont typeface="Arial" charset="0"/>
+              <a:buChar char="•"/>
+            </a:pPr>
+            <a:r>
+              <a:rPr lang="en-US" dirty="0" smtClean="0"/>
+              <a:t>Create two markers </a:t>
+            </a:r>
+            <a:r>
+              <a:rPr lang="en-US" dirty="0" err="1" smtClean="0"/>
+              <a:t>SQLAccessible</a:t>
+            </a:r>
+            <a:r>
+              <a:rPr lang="en-US" dirty="0" smtClean="0"/>
+              <a:t>, </a:t>
+            </a:r>
+            <a:r>
+              <a:rPr lang="en-US" dirty="0" err="1" smtClean="0"/>
+              <a:t>StaticAccessible</a:t>
+            </a:r>
+            <a:r>
+              <a:rPr lang="en-US" dirty="0"/>
+              <a:t> </a:t>
+            </a:r>
+            <a:r>
+              <a:rPr lang="en-US" dirty="0" smtClean="0"/>
+              <a:t>to signify SQL database and Static database are available</a:t>
+            </a:r>
+          </a:p>
+          <a:p>
+            <a:pPr>
+              <a:buFont typeface="Symbol" charset="2"/>
+              <a:buChar char="Þ"/>
+            </a:pPr>
+            <a:r>
+              <a:rPr lang="en-US" dirty="0" smtClean="0"/>
+              <a:t> Enhance readability</a:t>
+            </a:r>
+          </a:p>
+        </p:txBody>
+      </p:sp>
+    </p:spTree>
+    <p:extLst>
+      <p:ext uri="{BB962C8B-B14F-4D97-AF65-F5344CB8AC3E}">
+        <p14:creationId xmlns:p14="http://schemas.microsoft.com/office/powerpoint/2010/main" val="275730780"/>
+      </p:ext>
+    </p:extLst>
+  </p:cSld>
+  <p:clrMapOvr>
+    <a:masterClrMapping/>
+  </p:clrMapOvr>
+</p:sld>
+</file>
+
+<file path=ppt/slides/slide16.xml><?xml version="1.0" encoding="utf-8"?>
+<p:sld xmlns:a="http://schemas.openxmlformats.org/drawingml/2006/main" xmlns:r="http://schemas.openxmlformats.org/officeDocument/2006/relationships" xmlns:p="http://schemas.openxmlformats.org/presentationml/2006/main">
+  <p:cSld>
+    <p:spTree>
+      <p:nvGrpSpPr>
+        <p:cNvPr id="1" name=""/>
+        <p:cNvGrpSpPr/>
+        <p:nvPr/>
+      </p:nvGrpSpPr>
+      <p:grpSpPr>
+        <a:xfrm>
+          <a:off x="0" y="0"/>
+          <a:ext cx="0" cy="0"/>
+          <a:chOff x="0" y="0"/>
+          <a:chExt cx="0" cy="0"/>
+        </a:xfrm>
+      </p:grpSpPr>
+      <p:sp>
+        <p:nvSpPr>
+          <p:cNvPr id="2" name="Title 1"/>
+          <p:cNvSpPr>
+            <a:spLocks noGrp="1"/>
+          </p:cNvSpPr>
+          <p:nvPr>
+            <p:ph type="title"/>
+          </p:nvPr>
+        </p:nvSpPr>
+        <p:spPr/>
+        <p:txBody>
+          <a:bodyPr/>
+          <a:lstStyle/>
+          <a:p>
+            <a:r>
+              <a:rPr lang="en-US" dirty="0" smtClean="0"/>
+              <a:t>Algorithms / Libraries used</a:t>
+            </a:r>
+            <a:endParaRPr lang="en-US" dirty="0"/>
+          </a:p>
+        </p:txBody>
+      </p:sp>
+      <p:sp>
+        <p:nvSpPr>
+          <p:cNvPr id="3" name="Content Placeholder 2"/>
+          <p:cNvSpPr>
+            <a:spLocks noGrp="1"/>
+          </p:cNvSpPr>
+          <p:nvPr>
+            <p:ph idx="1"/>
+          </p:nvPr>
+        </p:nvSpPr>
+        <p:spPr/>
+        <p:txBody>
+          <a:bodyPr/>
+          <a:lstStyle/>
+          <a:p>
+            <a:pPr>
+              <a:buFontTx/>
+              <a:buChar char="-"/>
+            </a:pPr>
+            <a:r>
+              <a:rPr lang="en-US" dirty="0" smtClean="0"/>
+              <a:t>Wagner-Fischer’s Algorithm to handle users’ typos</a:t>
+            </a:r>
+          </a:p>
+          <a:p>
+            <a:pPr>
+              <a:buFontTx/>
+              <a:buChar char="-"/>
+            </a:pPr>
+            <a:r>
+              <a:rPr lang="en-US" dirty="0" smtClean="0"/>
+              <a:t>JSON, </a:t>
+            </a:r>
+            <a:r>
+              <a:rPr lang="en-US" dirty="0" err="1" smtClean="0"/>
+              <a:t>Jsoup</a:t>
+            </a:r>
+            <a:r>
+              <a:rPr lang="en-US" dirty="0" smtClean="0"/>
+              <a:t> for web crawling</a:t>
+            </a:r>
+          </a:p>
+          <a:p>
+            <a:pPr>
+              <a:buFontTx/>
+              <a:buChar char="-"/>
+            </a:pPr>
+            <a:r>
+              <a:rPr lang="en-US" dirty="0"/>
+              <a:t>(</a:t>
+            </a:r>
+            <a:r>
+              <a:rPr lang="en-US" dirty="0" smtClean="0"/>
+              <a:t>Named Entity Recognizer)</a:t>
+            </a:r>
+            <a:endParaRPr lang="en-US" dirty="0"/>
+          </a:p>
+        </p:txBody>
+      </p:sp>
+    </p:spTree>
+    <p:extLst>
+      <p:ext uri="{BB962C8B-B14F-4D97-AF65-F5344CB8AC3E}">
+        <p14:creationId xmlns:p14="http://schemas.microsoft.com/office/powerpoint/2010/main" val="1567885168"/>
+      </p:ext>
+    </p:extLst>
+  </p:cSld>
+  <p:clrMapOvr>
+    <a:masterClrMapping/>
+  </p:clrMapOvr>
+</p:sld>
+</file>
+
+<file path=ppt/slides/slide17.xml><?xml version="1.0" encoding="utf-8"?>
+<p:sld xmlns:a="http://schemas.openxmlformats.org/drawingml/2006/main" xmlns:r="http://schemas.openxmlformats.org/officeDocument/2006/relationships" xmlns:p="http://schemas.openxmlformats.org/presentationml/2006/main">
+  <p:cSld>
+    <p:spTree>
+      <p:nvGrpSpPr>
+        <p:cNvPr id="1" name=""/>
+        <p:cNvGrpSpPr/>
+        <p:nvPr/>
+      </p:nvGrpSpPr>
+      <p:grpSpPr>
+        <a:xfrm>
+          <a:off x="0" y="0"/>
+          <a:ext cx="0" cy="0"/>
+          <a:chOff x="0" y="0"/>
+          <a:chExt cx="0" cy="0"/>
+        </a:xfrm>
+      </p:grpSpPr>
+      <p:sp>
+        <p:nvSpPr>
+          <p:cNvPr id="2" name="Title 1"/>
+          <p:cNvSpPr>
+            <a:spLocks noGrp="1"/>
+          </p:cNvSpPr>
+          <p:nvPr>
+            <p:ph type="title"/>
+          </p:nvPr>
+        </p:nvSpPr>
+        <p:spPr/>
+        <p:txBody>
+          <a:bodyPr/>
+          <a:lstStyle/>
+          <a:p>
+            <a:r>
+              <a:rPr lang="en-US" dirty="0" smtClean="0"/>
+              <a:t>Technical Difficulty</a:t>
+            </a:r>
+            <a:endParaRPr lang="en-US" dirty="0"/>
+          </a:p>
+        </p:txBody>
+      </p:sp>
+      <p:sp>
+        <p:nvSpPr>
+          <p:cNvPr id="3" name="Content Placeholder 2"/>
+          <p:cNvSpPr>
+            <a:spLocks noGrp="1"/>
+          </p:cNvSpPr>
+          <p:nvPr>
+            <p:ph idx="1"/>
+          </p:nvPr>
+        </p:nvSpPr>
+        <p:spPr/>
+        <p:txBody>
+          <a:bodyPr/>
+          <a:lstStyle/>
+          <a:p>
+            <a:pPr marL="0" indent="0">
+              <a:buNone/>
+            </a:pPr>
+            <a:r>
+              <a:rPr lang="en-US" dirty="0" err="1" smtClean="0"/>
+              <a:t>TimeTable</a:t>
+            </a:r>
+            <a:r>
+              <a:rPr lang="en-US" dirty="0" smtClean="0"/>
+              <a:t> feature</a:t>
+            </a:r>
+          </a:p>
+          <a:p>
+            <a:pPr>
+              <a:buFontTx/>
+              <a:buChar char="-"/>
+            </a:pPr>
+            <a:r>
+              <a:rPr lang="en-US" dirty="0" smtClean="0"/>
+              <a:t>Vague LINE Message API documentation</a:t>
+            </a:r>
+          </a:p>
+          <a:p>
+            <a:pPr>
+              <a:buFont typeface="Symbol" charset="2"/>
+              <a:buChar char="Þ"/>
+            </a:pPr>
+            <a:r>
+              <a:rPr lang="en-US" dirty="0" smtClean="0"/>
+              <a:t> Don’t know how to reply user at certain point in method (</a:t>
+            </a:r>
+            <a:r>
+              <a:rPr lang="en-US" dirty="0" err="1" smtClean="0"/>
+              <a:t>System.in</a:t>
+            </a:r>
+            <a:r>
+              <a:rPr lang="en-US" dirty="0" smtClean="0"/>
+              <a:t>)</a:t>
+            </a:r>
+          </a:p>
+          <a:p>
+            <a:pPr>
+              <a:buFont typeface="Symbol" charset="2"/>
+              <a:buChar char="Þ"/>
+            </a:pPr>
+            <a:r>
+              <a:rPr lang="en-US" dirty="0" smtClean="0"/>
+              <a:t> Have to modify the whole class</a:t>
+            </a:r>
+            <a:endParaRPr lang="en-US" dirty="0"/>
+          </a:p>
+        </p:txBody>
+      </p:sp>
+    </p:spTree>
+    <p:extLst>
+      <p:ext uri="{BB962C8B-B14F-4D97-AF65-F5344CB8AC3E}">
+        <p14:creationId xmlns:p14="http://schemas.microsoft.com/office/powerpoint/2010/main" val="1259077374"/>
+      </p:ext>
+    </p:extLst>
+  </p:cSld>
+  <p:clrMapOvr>
+    <a:masterClrMapping/>
+  </p:clrMapOvr>
+</p:sld>
+</file>
+
+<file path=ppt/slides/slide18.xml><?xml version="1.0" encoding="utf-8"?>
+<p:sld xmlns:a="http://schemas.openxmlformats.org/drawingml/2006/main" xmlns:r="http://schemas.openxmlformats.org/officeDocument/2006/relationships" xmlns:p="http://schemas.openxmlformats.org/presentationml/2006/main">
+  <p:cSld>
+    <p:spTree>
+      <p:nvGrpSpPr>
+        <p:cNvPr id="1" name=""/>
+        <p:cNvGrpSpPr/>
+        <p:nvPr/>
+      </p:nvGrpSpPr>
+      <p:grpSpPr>
+        <a:xfrm>
+          <a:off x="0" y="0"/>
+          <a:ext cx="0" cy="0"/>
+          <a:chOff x="0" y="0"/>
+          <a:chExt cx="0" cy="0"/>
+        </a:xfrm>
+      </p:grpSpPr>
+      <p:sp>
+        <p:nvSpPr>
+          <p:cNvPr id="2" name="Title 1"/>
+          <p:cNvSpPr>
+            <a:spLocks noGrp="1"/>
+          </p:cNvSpPr>
+          <p:nvPr>
+            <p:ph type="title"/>
+          </p:nvPr>
+        </p:nvSpPr>
+        <p:spPr/>
+        <p:txBody>
+          <a:bodyPr/>
+          <a:lstStyle/>
+          <a:p>
+            <a:r>
+              <a:rPr lang="en-US" dirty="0" smtClean="0"/>
+              <a:t>Team Difficulty</a:t>
+            </a:r>
+            <a:endParaRPr lang="en-US" dirty="0"/>
+          </a:p>
+        </p:txBody>
+      </p:sp>
+      <p:sp>
+        <p:nvSpPr>
+          <p:cNvPr id="3" name="Content Placeholder 2"/>
+          <p:cNvSpPr>
+            <a:spLocks noGrp="1"/>
+          </p:cNvSpPr>
+          <p:nvPr>
+            <p:ph idx="1"/>
+          </p:nvPr>
+        </p:nvSpPr>
+        <p:spPr/>
+        <p:txBody>
+          <a:bodyPr/>
+          <a:lstStyle/>
+          <a:p>
+            <a:pPr>
+              <a:buFontTx/>
+              <a:buChar char="-"/>
+            </a:pPr>
+            <a:r>
+              <a:rPr lang="en-US" dirty="0" smtClean="0"/>
+              <a:t>Most of us only have few knowledge on Java Spring and </a:t>
+            </a:r>
+            <a:r>
+              <a:rPr lang="en-US" dirty="0" err="1" smtClean="0"/>
+              <a:t>Gradle</a:t>
+            </a:r>
+            <a:endParaRPr lang="en-US" dirty="0" smtClean="0"/>
+          </a:p>
+          <a:p>
+            <a:pPr>
+              <a:buFontTx/>
+              <a:buChar char="-"/>
+            </a:pPr>
+            <a:r>
+              <a:rPr lang="en-US" dirty="0" smtClean="0"/>
+              <a:t>Huge workload, not only dealing with this course</a:t>
+            </a:r>
+          </a:p>
+          <a:p>
+            <a:pPr>
+              <a:buFontTx/>
+              <a:buChar char="-"/>
+            </a:pPr>
+            <a:r>
+              <a:rPr lang="en-US" dirty="0" smtClean="0"/>
+              <a:t>Time constraint</a:t>
+            </a:r>
+            <a:endParaRPr lang="en-US" dirty="0"/>
+          </a:p>
+        </p:txBody>
+      </p:sp>
+    </p:spTree>
+    <p:extLst>
+      <p:ext uri="{BB962C8B-B14F-4D97-AF65-F5344CB8AC3E}">
+        <p14:creationId xmlns:p14="http://schemas.microsoft.com/office/powerpoint/2010/main" val="1779121371"/>
+      </p:ext>
+    </p:extLst>
+  </p:cSld>
+  <p:clrMapOvr>
+    <a:masterClrMapping/>
+  </p:clrMapOvr>
+</p:sld>
+</file>
+
 <file path=ppt/slides/slide2.xml><?xml version="1.0" encoding="utf-8"?>
 <p:sld xmlns:a="http://schemas.openxmlformats.org/drawingml/2006/main" xmlns:r="http://schemas.openxmlformats.org/officeDocument/2006/relationships" xmlns:p="http://schemas.openxmlformats.org/presentationml/2006/main">
   <p:cSld>

</xml_diff>